<commit_message>
pptx updated with PCA results
</commit_message>
<xml_diff>
--- a/1000genomes_Presentation.pptx
+++ b/1000genomes_Presentation.pptx
@@ -8,6 +8,7 @@
     <p:sldId id="256" r:id="rId2"/>
     <p:sldId id="258" r:id="rId3"/>
     <p:sldId id="257" r:id="rId4"/>
+    <p:sldId id="259" r:id="rId5"/>
   </p:sldIdLst>
   <p:sldSz cx="12192000" cy="6858000"/>
   <p:notesSz cx="6858000" cy="9144000"/>
@@ -10116,6 +10117,279 @@
 </p:sld>
 </file>
 
+<file path=ppt/slides/slide4.xml><?xml version="1.0" encoding="utf-8"?>
+<p:sld xmlns:a="http://schemas.openxmlformats.org/drawingml/2006/main" xmlns:r="http://schemas.openxmlformats.org/officeDocument/2006/relationships" xmlns:p="http://schemas.openxmlformats.org/presentationml/2006/main">
+  <p:cSld>
+    <p:spTree>
+      <p:nvGrpSpPr>
+        <p:cNvPr id="1" name=""/>
+        <p:cNvGrpSpPr/>
+        <p:nvPr/>
+      </p:nvGrpSpPr>
+      <p:grpSpPr>
+        <a:xfrm>
+          <a:off x="0" y="0"/>
+          <a:ext cx="0" cy="0"/>
+          <a:chOff x="0" y="0"/>
+          <a:chExt cx="0" cy="0"/>
+        </a:xfrm>
+      </p:grpSpPr>
+      <p:sp>
+        <p:nvSpPr>
+          <p:cNvPr id="2" name="Title 1">
+            <a:extLst>
+              <a:ext uri="{FF2B5EF4-FFF2-40B4-BE49-F238E27FC236}">
+                <a16:creationId xmlns:a16="http://schemas.microsoft.com/office/drawing/2014/main" id="{4E5C74DC-0BE9-D7D5-5D7D-CC2819544AD6}"/>
+              </a:ext>
+            </a:extLst>
+          </p:cNvPr>
+          <p:cNvSpPr>
+            <a:spLocks noGrp="1"/>
+          </p:cNvSpPr>
+          <p:nvPr>
+            <p:ph type="title"/>
+          </p:nvPr>
+        </p:nvSpPr>
+        <p:spPr>
+          <a:xfrm>
+            <a:off x="581192" y="702156"/>
+            <a:ext cx="11029616" cy="556373"/>
+          </a:xfrm>
+        </p:spPr>
+        <p:txBody>
+          <a:bodyPr>
+            <a:normAutofit fontScale="90000"/>
+          </a:bodyPr>
+          <a:lstStyle/>
+          <a:p>
+            <a:r>
+              <a:rPr lang="en-AU" dirty="0"/>
+              <a:t>Results: </a:t>
+            </a:r>
+            <a:r>
+              <a:rPr lang="en-AU" dirty="0" err="1"/>
+              <a:t>pca</a:t>
+            </a:r>
+            <a:endParaRPr lang="en-AU" dirty="0"/>
+          </a:p>
+        </p:txBody>
+      </p:sp>
+      <p:sp>
+        <p:nvSpPr>
+          <p:cNvPr id="3" name="Content Placeholder 2">
+            <a:extLst>
+              <a:ext uri="{FF2B5EF4-FFF2-40B4-BE49-F238E27FC236}">
+                <a16:creationId xmlns:a16="http://schemas.microsoft.com/office/drawing/2014/main" id="{C0F00A4F-A06A-5F08-FC72-400C7F2C2ED3}"/>
+              </a:ext>
+            </a:extLst>
+          </p:cNvPr>
+          <p:cNvSpPr>
+            <a:spLocks noGrp="1"/>
+          </p:cNvSpPr>
+          <p:nvPr>
+            <p:ph idx="1"/>
+          </p:nvPr>
+        </p:nvSpPr>
+        <p:spPr>
+          <a:xfrm>
+            <a:off x="581193" y="1520687"/>
+            <a:ext cx="4984720" cy="4454663"/>
+          </a:xfrm>
+        </p:spPr>
+        <p:txBody>
+          <a:bodyPr anchor="t"/>
+          <a:lstStyle/>
+          <a:p>
+            <a:r>
+              <a:rPr lang="en-AU" dirty="0"/>
+              <a:t>Two principal components clearly distinguished African and East Asian ancestry groups</a:t>
+            </a:r>
+          </a:p>
+          <a:p>
+            <a:pPr marL="0" indent="0">
+              <a:buNone/>
+            </a:pPr>
+            <a:endParaRPr lang="en-AU" dirty="0"/>
+          </a:p>
+          <a:p>
+            <a:r>
+              <a:rPr lang="en-AU" dirty="0"/>
+              <a:t>Unsurprisingly, high degree of overlap between European, American, &amp; South American ancestry groups</a:t>
+            </a:r>
+          </a:p>
+          <a:p>
+            <a:pPr lvl="1"/>
+            <a:r>
+              <a:rPr lang="en-AU" dirty="0"/>
+              <a:t>Suggests need for more complex classification methods to distinguish these</a:t>
+            </a:r>
+          </a:p>
+        </p:txBody>
+      </p:sp>
+      <p:pic>
+        <p:nvPicPr>
+          <p:cNvPr id="1026" name="Picture 2">
+            <a:extLst>
+              <a:ext uri="{FF2B5EF4-FFF2-40B4-BE49-F238E27FC236}">
+                <a16:creationId xmlns:a16="http://schemas.microsoft.com/office/drawing/2014/main" id="{E3CA938F-39B6-516B-CA87-4F723451B952}"/>
+              </a:ext>
+            </a:extLst>
+          </p:cNvPr>
+          <p:cNvPicPr>
+            <a:picLocks noChangeAspect="1" noChangeArrowheads="1"/>
+          </p:cNvPicPr>
+          <p:nvPr/>
+        </p:nvPicPr>
+        <p:blipFill>
+          <a:blip r:embed="rId2">
+            <a:extLst>
+              <a:ext uri="{28A0092B-C50C-407E-A947-70E740481C1C}">
+                <a14:useLocalDpi xmlns:a14="http://schemas.microsoft.com/office/drawing/2010/main" val="0"/>
+              </a:ext>
+            </a:extLst>
+          </a:blip>
+          <a:srcRect/>
+          <a:stretch>
+            <a:fillRect/>
+          </a:stretch>
+        </p:blipFill>
+        <p:spPr bwMode="auto">
+          <a:xfrm>
+            <a:off x="5799614" y="1520687"/>
+            <a:ext cx="6025217" cy="4454663"/>
+          </a:xfrm>
+          <a:prstGeom prst="rect">
+            <a:avLst/>
+          </a:prstGeom>
+          <a:noFill/>
+          <a:extLst>
+            <a:ext uri="{909E8E84-426E-40DD-AFC4-6F175D3DCCD1}">
+              <a14:hiddenFill xmlns:a14="http://schemas.microsoft.com/office/drawing/2010/main">
+                <a:solidFill>
+                  <a:srgbClr val="FFFFFF"/>
+                </a:solidFill>
+              </a14:hiddenFill>
+            </a:ext>
+          </a:extLst>
+        </p:spPr>
+      </p:pic>
+      <p:sp>
+        <p:nvSpPr>
+          <p:cNvPr id="4" name="Oval 3">
+            <a:extLst>
+              <a:ext uri="{FF2B5EF4-FFF2-40B4-BE49-F238E27FC236}">
+                <a16:creationId xmlns:a16="http://schemas.microsoft.com/office/drawing/2014/main" id="{75829689-C106-A5F3-3A03-ABA22F5B842C}"/>
+              </a:ext>
+            </a:extLst>
+          </p:cNvPr>
+          <p:cNvSpPr/>
+          <p:nvPr/>
+        </p:nvSpPr>
+        <p:spPr>
+          <a:xfrm>
+            <a:off x="6374530" y="2576053"/>
+            <a:ext cx="2871020" cy="1624780"/>
+          </a:xfrm>
+          <a:prstGeom prst="ellipse">
+            <a:avLst/>
+          </a:prstGeom>
+          <a:noFill/>
+          <a:ln>
+            <a:solidFill>
+              <a:srgbClr val="C00000"/>
+            </a:solidFill>
+          </a:ln>
+        </p:spPr>
+        <p:style>
+          <a:lnRef idx="2">
+            <a:schemeClr val="accent1">
+              <a:shade val="15000"/>
+            </a:schemeClr>
+          </a:lnRef>
+          <a:fillRef idx="1">
+            <a:schemeClr val="accent1"/>
+          </a:fillRef>
+          <a:effectRef idx="0">
+            <a:schemeClr val="accent1"/>
+          </a:effectRef>
+          <a:fontRef idx="minor">
+            <a:schemeClr val="lt1"/>
+          </a:fontRef>
+        </p:style>
+        <p:txBody>
+          <a:bodyPr rtlCol="0" anchor="ctr"/>
+          <a:lstStyle/>
+          <a:p>
+            <a:pPr algn="ctr"/>
+            <a:endParaRPr lang="en-AU"/>
+          </a:p>
+        </p:txBody>
+      </p:sp>
+      <p:sp>
+        <p:nvSpPr>
+          <p:cNvPr id="5" name="Oval 4">
+            <a:extLst>
+              <a:ext uri="{FF2B5EF4-FFF2-40B4-BE49-F238E27FC236}">
+                <a16:creationId xmlns:a16="http://schemas.microsoft.com/office/drawing/2014/main" id="{A71C46C3-56A8-108E-B237-6C6513A36EEC}"/>
+              </a:ext>
+            </a:extLst>
+          </p:cNvPr>
+          <p:cNvSpPr/>
+          <p:nvPr/>
+        </p:nvSpPr>
+        <p:spPr>
+          <a:xfrm>
+            <a:off x="9591261" y="3866322"/>
+            <a:ext cx="2182140" cy="1778994"/>
+          </a:xfrm>
+          <a:prstGeom prst="ellipse">
+            <a:avLst/>
+          </a:prstGeom>
+          <a:noFill/>
+          <a:ln>
+            <a:solidFill>
+              <a:srgbClr val="C00000"/>
+            </a:solidFill>
+          </a:ln>
+        </p:spPr>
+        <p:style>
+          <a:lnRef idx="2">
+            <a:schemeClr val="accent1">
+              <a:shade val="15000"/>
+            </a:schemeClr>
+          </a:lnRef>
+          <a:fillRef idx="1">
+            <a:schemeClr val="accent1"/>
+          </a:fillRef>
+          <a:effectRef idx="0">
+            <a:schemeClr val="accent1"/>
+          </a:effectRef>
+          <a:fontRef idx="minor">
+            <a:schemeClr val="lt1"/>
+          </a:fontRef>
+        </p:style>
+        <p:txBody>
+          <a:bodyPr rtlCol="0" anchor="ctr"/>
+          <a:lstStyle/>
+          <a:p>
+            <a:pPr algn="ctr"/>
+            <a:endParaRPr lang="en-AU"/>
+          </a:p>
+        </p:txBody>
+      </p:sp>
+    </p:spTree>
+    <p:extLst>
+      <p:ext uri="{BB962C8B-B14F-4D97-AF65-F5344CB8AC3E}">
+        <p14:creationId xmlns:p14="http://schemas.microsoft.com/office/powerpoint/2010/main" val="1084365285"/>
+      </p:ext>
+    </p:extLst>
+  </p:cSld>
+  <p:clrMapOvr>
+    <a:masterClrMapping/>
+  </p:clrMapOvr>
+</p:sld>
+</file>
+
 <file path=ppt/theme/theme1.xml><?xml version="1.0" encoding="utf-8"?>
 <a:theme xmlns:a="http://schemas.openxmlformats.org/drawingml/2006/main" name="DividendVTI">
   <a:themeElements>

</xml_diff>

<commit_message>
pptx updated with NN methods
</commit_message>
<xml_diff>
--- a/1000genomes_Presentation.pptx
+++ b/1000genomes_Presentation.pptx
@@ -9,6 +9,7 @@
     <p:sldId id="258" r:id="rId3"/>
     <p:sldId id="257" r:id="rId4"/>
     <p:sldId id="259" r:id="rId5"/>
+    <p:sldId id="260" r:id="rId6"/>
   </p:sldIdLst>
   <p:sldSz cx="12192000" cy="6858000"/>
   <p:notesSz cx="6858000" cy="9144000"/>
@@ -10390,6 +10391,165 @@
 </p:sld>
 </file>
 
+<file path=ppt/slides/slide5.xml><?xml version="1.0" encoding="utf-8"?>
+<p:sld xmlns:a="http://schemas.openxmlformats.org/drawingml/2006/main" xmlns:r="http://schemas.openxmlformats.org/officeDocument/2006/relationships" xmlns:p="http://schemas.openxmlformats.org/presentationml/2006/main">
+  <p:cSld>
+    <p:spTree>
+      <p:nvGrpSpPr>
+        <p:cNvPr id="1" name=""/>
+        <p:cNvGrpSpPr/>
+        <p:nvPr/>
+      </p:nvGrpSpPr>
+      <p:grpSpPr>
+        <a:xfrm>
+          <a:off x="0" y="0"/>
+          <a:ext cx="0" cy="0"/>
+          <a:chOff x="0" y="0"/>
+          <a:chExt cx="0" cy="0"/>
+        </a:xfrm>
+      </p:grpSpPr>
+      <p:sp>
+        <p:nvSpPr>
+          <p:cNvPr id="2" name="Title 1">
+            <a:extLst>
+              <a:ext uri="{FF2B5EF4-FFF2-40B4-BE49-F238E27FC236}">
+                <a16:creationId xmlns:a16="http://schemas.microsoft.com/office/drawing/2014/main" id="{4E5C74DC-0BE9-D7D5-5D7D-CC2819544AD6}"/>
+              </a:ext>
+            </a:extLst>
+          </p:cNvPr>
+          <p:cNvSpPr>
+            <a:spLocks noGrp="1"/>
+          </p:cNvSpPr>
+          <p:nvPr>
+            <p:ph type="title"/>
+          </p:nvPr>
+        </p:nvSpPr>
+        <p:spPr>
+          <a:xfrm>
+            <a:off x="581192" y="702156"/>
+            <a:ext cx="11029616" cy="556373"/>
+          </a:xfrm>
+        </p:spPr>
+        <p:txBody>
+          <a:bodyPr>
+            <a:normAutofit fontScale="90000"/>
+          </a:bodyPr>
+          <a:lstStyle/>
+          <a:p>
+            <a:r>
+              <a:rPr lang="en-AU" dirty="0"/>
+              <a:t>Results: Neural network</a:t>
+            </a:r>
+          </a:p>
+        </p:txBody>
+      </p:sp>
+      <p:sp>
+        <p:nvSpPr>
+          <p:cNvPr id="3" name="Content Placeholder 2">
+            <a:extLst>
+              <a:ext uri="{FF2B5EF4-FFF2-40B4-BE49-F238E27FC236}">
+                <a16:creationId xmlns:a16="http://schemas.microsoft.com/office/drawing/2014/main" id="{C0F00A4F-A06A-5F08-FC72-400C7F2C2ED3}"/>
+              </a:ext>
+            </a:extLst>
+          </p:cNvPr>
+          <p:cNvSpPr>
+            <a:spLocks noGrp="1"/>
+          </p:cNvSpPr>
+          <p:nvPr>
+            <p:ph idx="1"/>
+          </p:nvPr>
+        </p:nvSpPr>
+        <p:spPr>
+          <a:xfrm>
+            <a:off x="581192" y="1520687"/>
+            <a:ext cx="11029615" cy="4454663"/>
+          </a:xfrm>
+        </p:spPr>
+        <p:txBody>
+          <a:bodyPr anchor="t"/>
+          <a:lstStyle/>
+          <a:p>
+            <a:r>
+              <a:rPr lang="en-AU" dirty="0"/>
+              <a:t>Target variable (i.e., ancestry superpopulation) represents a categorical outcome with 5 classes:</a:t>
+            </a:r>
+          </a:p>
+          <a:p>
+            <a:pPr lvl="1"/>
+            <a:r>
+              <a:rPr lang="en-AU" b="1" dirty="0"/>
+              <a:t>New package: </a:t>
+            </a:r>
+            <a:r>
+              <a:rPr lang="en-AU" dirty="0" err="1"/>
+              <a:t>tensorflow.keras.utils</a:t>
+            </a:r>
+            <a:r>
+              <a:rPr lang="en-AU" dirty="0"/>
+              <a:t> import </a:t>
+            </a:r>
+            <a:r>
+              <a:rPr lang="en-AU" dirty="0" err="1"/>
+              <a:t>to_categorical</a:t>
+            </a:r>
+            <a:r>
+              <a:rPr lang="en-AU" dirty="0"/>
+              <a:t>()</a:t>
+            </a:r>
+          </a:p>
+          <a:p>
+            <a:pPr lvl="1"/>
+            <a:r>
+              <a:rPr lang="en-AU" b="1" dirty="0"/>
+              <a:t>New activation function:</a:t>
+            </a:r>
+            <a:r>
+              <a:rPr lang="en-AU" dirty="0"/>
+              <a:t> ‘</a:t>
+            </a:r>
+            <a:r>
+              <a:rPr lang="en-AU" dirty="0" err="1"/>
+              <a:t>softmax</a:t>
+            </a:r>
+            <a:r>
+              <a:rPr lang="en-AU" dirty="0"/>
+              <a:t>’</a:t>
+            </a:r>
+          </a:p>
+          <a:p>
+            <a:pPr lvl="1"/>
+            <a:r>
+              <a:rPr lang="en-AU" b="1" dirty="0"/>
+              <a:t>New loss function: </a:t>
+            </a:r>
+            <a:r>
+              <a:rPr lang="en-AU" dirty="0"/>
+              <a:t>‘</a:t>
+            </a:r>
+            <a:r>
+              <a:rPr lang="en-AU" dirty="0" err="1"/>
+              <a:t>categorical_crossentropy</a:t>
+            </a:r>
+            <a:r>
+              <a:rPr lang="en-AU" dirty="0"/>
+              <a:t>’</a:t>
+            </a:r>
+          </a:p>
+        </p:txBody>
+      </p:sp>
+    </p:spTree>
+    <p:extLst>
+      <p:ext uri="{BB962C8B-B14F-4D97-AF65-F5344CB8AC3E}">
+        <p14:creationId xmlns:p14="http://schemas.microsoft.com/office/powerpoint/2010/main" val="1849935178"/>
+      </p:ext>
+    </p:extLst>
+  </p:cSld>
+  <p:clrMapOvr>
+    <a:masterClrMapping/>
+  </p:clrMapOvr>
+</p:sld>
+</file>
+
 <file path=ppt/theme/theme1.xml><?xml version="1.0" encoding="utf-8"?>
 <a:theme xmlns:a="http://schemas.openxmlformats.org/drawingml/2006/main" name="DividendVTI">
   <a:themeElements>

</xml_diff>